<commit_message>
Updated progress & challenges slide
</commit_message>
<xml_diff>
--- a/Project Progress.pptx
+++ b/Project Progress.pptx
@@ -5726,6 +5726,91 @@
       </p:grpSpPr>
       <p:sp>
         <p:nvSpPr>
+          <p:cNvPr id="4" name="Text Placeholder 3">
+            <a:extLst>
+              <a:ext uri="{FF2B5EF4-FFF2-40B4-BE49-F238E27FC236}">
+                <a16:creationId xmlns:a16="http://schemas.microsoft.com/office/drawing/2014/main" id="{7EAA1080-AE5E-4D94-9CBE-E3A2F19DA30C}"/>
+              </a:ext>
+            </a:extLst>
+          </p:cNvPr>
+          <p:cNvSpPr>
+            <a:spLocks noGrp="1"/>
+          </p:cNvSpPr>
+          <p:nvPr>
+            <p:ph type="body"/>
+          </p:nvPr>
+        </p:nvSpPr>
+        <p:spPr/>
+        <p:txBody>
+          <a:bodyPr/>
+          <a:lstStyle/>
+          <a:p>
+            <a:r>
+              <a:rPr lang="en-US" dirty="0"/>
+              <a:t>Finished converting </a:t>
+            </a:r>
+            <a:r>
+              <a:rPr lang="en-US" dirty="0" err="1"/>
+              <a:t>Matlab</a:t>
+            </a:r>
+            <a:r>
+              <a:rPr lang="en-US" dirty="0"/>
+              <a:t> code to Python</a:t>
+            </a:r>
+          </a:p>
+          <a:p>
+            <a:pPr lvl="1"/>
+            <a:r>
+              <a:rPr lang="en-US" dirty="0"/>
+              <a:t>Traffic generation, collision detection, </a:t>
+            </a:r>
+            <a:r>
+              <a:rPr lang="en-US"/>
+              <a:t>car management</a:t>
+            </a:r>
+            <a:endParaRPr lang="en-US" dirty="0"/>
+          </a:p>
+          <a:p>
+            <a:pPr lvl="1"/>
+            <a:r>
+              <a:rPr lang="en-US" dirty="0"/>
+              <a:t>Challenges: Code was not robust and needed to be redesigned more than we expected</a:t>
+            </a:r>
+          </a:p>
+          <a:p>
+            <a:r>
+              <a:rPr lang="en-US" dirty="0"/>
+              <a:t>Developed simple visualization for testing</a:t>
+            </a:r>
+          </a:p>
+          <a:p>
+            <a:r>
+              <a:rPr lang="en-US" dirty="0"/>
+              <a:t>Implemented </a:t>
+            </a:r>
+            <a:r>
+              <a:rPr lang="en-US" dirty="0" err="1"/>
+              <a:t>Dresner</a:t>
+            </a:r>
+            <a:r>
+              <a:rPr lang="en-US" dirty="0"/>
+              <a:t>/Stone and stop sign policies.</a:t>
+            </a:r>
+          </a:p>
+          <a:p>
+            <a:pPr lvl="1"/>
+            <a:r>
+              <a:rPr lang="en-US" dirty="0"/>
+              <a:t>Challenges: More advanced traffic light policy has taken more time to formulate</a:t>
+            </a:r>
+          </a:p>
+          <a:p>
+            <a:endParaRPr lang="en-US" dirty="0"/>
+          </a:p>
+        </p:txBody>
+      </p:sp>
+      <p:sp>
+        <p:nvSpPr>
           <p:cNvPr id="2" name="Title 1">
             <a:extLst>
               <a:ext uri="{FF2B5EF4-FFF2-40B4-BE49-F238E27FC236}">
@@ -5749,31 +5834,6 @@
               <a:rPr lang="en-US" dirty="0"/>
               <a:t>Progress &amp; Challenges</a:t>
             </a:r>
-          </a:p>
-        </p:txBody>
-      </p:sp>
-      <p:sp>
-        <p:nvSpPr>
-          <p:cNvPr id="3" name="Subtitle 2">
-            <a:extLst>
-              <a:ext uri="{FF2B5EF4-FFF2-40B4-BE49-F238E27FC236}">
-                <a16:creationId xmlns:a16="http://schemas.microsoft.com/office/drawing/2014/main" id="{C0B0AB04-DE71-4648-BEE7-A41692F2B694}"/>
-              </a:ext>
-            </a:extLst>
-          </p:cNvPr>
-          <p:cNvSpPr>
-            <a:spLocks noGrp="1"/>
-          </p:cNvSpPr>
-          <p:nvPr>
-            <p:ph type="subTitle"/>
-          </p:nvPr>
-        </p:nvSpPr>
-        <p:spPr/>
-        <p:txBody>
-          <a:bodyPr/>
-          <a:lstStyle/>
-          <a:p>
-            <a:endParaRPr lang="en-US"/>
           </a:p>
         </p:txBody>
       </p:sp>

</xml_diff>